<commit_message>
added numbering to chapter 2 contents
</commit_message>
<xml_diff>
--- a/IS-PM-Slides/02_process and methods _ch2.pptx
+++ b/IS-PM-Slides/02_process and methods _ch2.pptx
@@ -8,7 +8,7 @@
     <p:sldMasterId id="2147483660" r:id="rId4"/>
   </p:sldMasterIdLst>
   <p:notesMasterIdLst>
-    <p:notesMasterId r:id="rId49"/>
+    <p:notesMasterId r:id="rId48"/>
   </p:notesMasterIdLst>
   <p:sldIdLst>
     <p:sldId id="256" r:id="rId5"/>
@@ -54,12 +54,11 @@
     <p:sldId id="334" r:id="rId45"/>
     <p:sldId id="335" r:id="rId46"/>
     <p:sldId id="336" r:id="rId47"/>
-    <p:sldId id="290" r:id="rId48"/>
   </p:sldIdLst>
   <p:sldSz cx="9144000" cy="6858000" type="screen4x3"/>
   <p:notesSz cx="6858000" cy="9144000"/>
   <p:custDataLst>
-    <p:tags r:id="rId50"/>
+    <p:tags r:id="rId49"/>
   </p:custDataLst>
   <p:defaultTextStyle>
     <a:defPPr>
@@ -205,16 +204,624 @@
 </p:presentation>
 </file>
 
-<file path=ppt/revisionInfo.xml><?xml version="1.0" encoding="utf-8"?>
-<p1510:revInfo xmlns:a="http://schemas.openxmlformats.org/drawingml/2006/main" xmlns:r="http://schemas.openxmlformats.org/officeDocument/2006/relationships" xmlns:p1510="http://schemas.microsoft.com/office/powerpoint/2015/10/main">
-  <p1510:revLst>
-    <p1510:client id="{02E1D72D-6DE0-46BC-BEC0-7B9CD0A4C269}" v="25" dt="2019-12-31T14:24:19.662"/>
-  </p1510:revLst>
-</p1510:revInfo>
-</file>
-
 <file path=ppt/changesInfos/changesInfo1.xml><?xml version="1.0" encoding="utf-8"?>
 <pc:chgInfo xmlns:a="http://schemas.openxmlformats.org/drawingml/2006/main" xmlns:r="http://schemas.openxmlformats.org/officeDocument/2006/relationships" xmlns:ac="http://schemas.microsoft.com/office/drawing/2013/main/command" xmlns:pc="http://schemas.microsoft.com/office/powerpoint/2013/main/command">
+  <pc:docChgLst>
+    <pc:chgData name="Osama hosam elde" userId="ab8f451e-a635-42ee-be12-e2dde55852bf" providerId="ADAL" clId="{D67B4E5B-1382-4A89-A69C-BC8F3049F1F7}"/>
+    <pc:docChg chg="delSld modSld">
+      <pc:chgData name="Osama hosam elde" userId="ab8f451e-a635-42ee-be12-e2dde55852bf" providerId="ADAL" clId="{D67B4E5B-1382-4A89-A69C-BC8F3049F1F7}" dt="2020-02-23T07:43:44.834" v="310" actId="20577"/>
+      <pc:docMkLst>
+        <pc:docMk/>
+      </pc:docMkLst>
+      <pc:sldChg chg="del">
+        <pc:chgData name="Osama hosam elde" userId="ab8f451e-a635-42ee-be12-e2dde55852bf" providerId="ADAL" clId="{D67B4E5B-1382-4A89-A69C-BC8F3049F1F7}" dt="2020-02-23T07:31:30.707" v="0" actId="2696"/>
+        <pc:sldMkLst>
+          <pc:docMk/>
+          <pc:sldMk cId="0" sldId="290"/>
+        </pc:sldMkLst>
+      </pc:sldChg>
+      <pc:sldChg chg="modSp">
+        <pc:chgData name="Osama hosam elde" userId="ab8f451e-a635-42ee-be12-e2dde55852bf" providerId="ADAL" clId="{D67B4E5B-1382-4A89-A69C-BC8F3049F1F7}" dt="2020-02-23T07:36:05.183" v="23" actId="5793"/>
+        <pc:sldMkLst>
+          <pc:docMk/>
+          <pc:sldMk cId="0" sldId="292"/>
+        </pc:sldMkLst>
+        <pc:spChg chg="mod">
+          <ac:chgData name="Osama hosam elde" userId="ab8f451e-a635-42ee-be12-e2dde55852bf" providerId="ADAL" clId="{D67B4E5B-1382-4A89-A69C-BC8F3049F1F7}" dt="2020-02-23T07:36:05.183" v="23" actId="5793"/>
+          <ac:spMkLst>
+            <pc:docMk/>
+            <pc:sldMk cId="0" sldId="292"/>
+            <ac:spMk id="53250" creationId="{00000000-0000-0000-0000-000000000000}"/>
+          </ac:spMkLst>
+        </pc:spChg>
+      </pc:sldChg>
+      <pc:sldChg chg="modSp">
+        <pc:chgData name="Osama hosam elde" userId="ab8f451e-a635-42ee-be12-e2dde55852bf" providerId="ADAL" clId="{D67B4E5B-1382-4A89-A69C-BC8F3049F1F7}" dt="2020-02-23T07:38:24.818" v="184" actId="20577"/>
+        <pc:sldMkLst>
+          <pc:docMk/>
+          <pc:sldMk cId="0" sldId="293"/>
+        </pc:sldMkLst>
+        <pc:spChg chg="mod">
+          <ac:chgData name="Osama hosam elde" userId="ab8f451e-a635-42ee-be12-e2dde55852bf" providerId="ADAL" clId="{D67B4E5B-1382-4A89-A69C-BC8F3049F1F7}" dt="2020-02-23T07:38:24.818" v="184" actId="20577"/>
+          <ac:spMkLst>
+            <pc:docMk/>
+            <pc:sldMk cId="0" sldId="293"/>
+            <ac:spMk id="56323" creationId="{00000000-0000-0000-0000-000000000000}"/>
+          </ac:spMkLst>
+        </pc:spChg>
+      </pc:sldChg>
+      <pc:sldChg chg="modSp">
+        <pc:chgData name="Osama hosam elde" userId="ab8f451e-a635-42ee-be12-e2dde55852bf" providerId="ADAL" clId="{D67B4E5B-1382-4A89-A69C-BC8F3049F1F7}" dt="2020-02-23T07:38:29.602" v="186" actId="20577"/>
+        <pc:sldMkLst>
+          <pc:docMk/>
+          <pc:sldMk cId="0" sldId="294"/>
+        </pc:sldMkLst>
+        <pc:spChg chg="mod">
+          <ac:chgData name="Osama hosam elde" userId="ab8f451e-a635-42ee-be12-e2dde55852bf" providerId="ADAL" clId="{D67B4E5B-1382-4A89-A69C-BC8F3049F1F7}" dt="2020-02-23T07:38:29.602" v="186" actId="20577"/>
+          <ac:spMkLst>
+            <pc:docMk/>
+            <pc:sldMk cId="0" sldId="294"/>
+            <ac:spMk id="57347" creationId="{00000000-0000-0000-0000-000000000000}"/>
+          </ac:spMkLst>
+        </pc:spChg>
+      </pc:sldChg>
+      <pc:sldChg chg="modSp">
+        <pc:chgData name="Osama hosam elde" userId="ab8f451e-a635-42ee-be12-e2dde55852bf" providerId="ADAL" clId="{D67B4E5B-1382-4A89-A69C-BC8F3049F1F7}" dt="2020-02-23T07:38:35.307" v="188" actId="20577"/>
+        <pc:sldMkLst>
+          <pc:docMk/>
+          <pc:sldMk cId="0" sldId="295"/>
+        </pc:sldMkLst>
+        <pc:spChg chg="mod">
+          <ac:chgData name="Osama hosam elde" userId="ab8f451e-a635-42ee-be12-e2dde55852bf" providerId="ADAL" clId="{D67B4E5B-1382-4A89-A69C-BC8F3049F1F7}" dt="2020-02-23T07:38:35.307" v="188" actId="20577"/>
+          <ac:spMkLst>
+            <pc:docMk/>
+            <pc:sldMk cId="0" sldId="295"/>
+            <ac:spMk id="58371" creationId="{00000000-0000-0000-0000-000000000000}"/>
+          </ac:spMkLst>
+        </pc:spChg>
+      </pc:sldChg>
+      <pc:sldChg chg="modSp">
+        <pc:chgData name="Osama hosam elde" userId="ab8f451e-a635-42ee-be12-e2dde55852bf" providerId="ADAL" clId="{D67B4E5B-1382-4A89-A69C-BC8F3049F1F7}" dt="2020-02-23T07:39:08.491" v="199" actId="20577"/>
+        <pc:sldMkLst>
+          <pc:docMk/>
+          <pc:sldMk cId="0" sldId="302"/>
+        </pc:sldMkLst>
+        <pc:spChg chg="mod">
+          <ac:chgData name="Osama hosam elde" userId="ab8f451e-a635-42ee-be12-e2dde55852bf" providerId="ADAL" clId="{D67B4E5B-1382-4A89-A69C-BC8F3049F1F7}" dt="2020-02-23T07:39:08.491" v="199" actId="20577"/>
+          <ac:spMkLst>
+            <pc:docMk/>
+            <pc:sldMk cId="0" sldId="302"/>
+            <ac:spMk id="69635" creationId="{00000000-0000-0000-0000-000000000000}"/>
+          </ac:spMkLst>
+        </pc:spChg>
+      </pc:sldChg>
+      <pc:sldChg chg="modSp">
+        <pc:chgData name="Osama hosam elde" userId="ab8f451e-a635-42ee-be12-e2dde55852bf" providerId="ADAL" clId="{D67B4E5B-1382-4A89-A69C-BC8F3049F1F7}" dt="2020-02-23T07:39:30.804" v="205" actId="20577"/>
+        <pc:sldMkLst>
+          <pc:docMk/>
+          <pc:sldMk cId="0" sldId="303"/>
+        </pc:sldMkLst>
+        <pc:spChg chg="mod">
+          <ac:chgData name="Osama hosam elde" userId="ab8f451e-a635-42ee-be12-e2dde55852bf" providerId="ADAL" clId="{D67B4E5B-1382-4A89-A69C-BC8F3049F1F7}" dt="2020-02-23T07:39:30.804" v="205" actId="20577"/>
+          <ac:spMkLst>
+            <pc:docMk/>
+            <pc:sldMk cId="0" sldId="303"/>
+            <ac:spMk id="72707" creationId="{00000000-0000-0000-0000-000000000000}"/>
+          </ac:spMkLst>
+        </pc:spChg>
+      </pc:sldChg>
+      <pc:sldChg chg="modSp">
+        <pc:chgData name="Osama hosam elde" userId="ab8f451e-a635-42ee-be12-e2dde55852bf" providerId="ADAL" clId="{D67B4E5B-1382-4A89-A69C-BC8F3049F1F7}" dt="2020-02-23T07:39:36.868" v="207" actId="20577"/>
+        <pc:sldMkLst>
+          <pc:docMk/>
+          <pc:sldMk cId="0" sldId="304"/>
+        </pc:sldMkLst>
+        <pc:spChg chg="mod">
+          <ac:chgData name="Osama hosam elde" userId="ab8f451e-a635-42ee-be12-e2dde55852bf" providerId="ADAL" clId="{D67B4E5B-1382-4A89-A69C-BC8F3049F1F7}" dt="2020-02-23T07:39:36.868" v="207" actId="20577"/>
+          <ac:spMkLst>
+            <pc:docMk/>
+            <pc:sldMk cId="0" sldId="304"/>
+            <ac:spMk id="73731" creationId="{00000000-0000-0000-0000-000000000000}"/>
+          </ac:spMkLst>
+        </pc:spChg>
+      </pc:sldChg>
+      <pc:sldChg chg="modSp">
+        <pc:chgData name="Osama hosam elde" userId="ab8f451e-a635-42ee-be12-e2dde55852bf" providerId="ADAL" clId="{D67B4E5B-1382-4A89-A69C-BC8F3049F1F7}" dt="2020-02-23T07:39:41.085" v="209" actId="20577"/>
+        <pc:sldMkLst>
+          <pc:docMk/>
+          <pc:sldMk cId="0" sldId="305"/>
+        </pc:sldMkLst>
+        <pc:spChg chg="mod">
+          <ac:chgData name="Osama hosam elde" userId="ab8f451e-a635-42ee-be12-e2dde55852bf" providerId="ADAL" clId="{D67B4E5B-1382-4A89-A69C-BC8F3049F1F7}" dt="2020-02-23T07:39:41.085" v="209" actId="20577"/>
+          <ac:spMkLst>
+            <pc:docMk/>
+            <pc:sldMk cId="0" sldId="305"/>
+            <ac:spMk id="74755" creationId="{00000000-0000-0000-0000-000000000000}"/>
+          </ac:spMkLst>
+        </pc:spChg>
+      </pc:sldChg>
+      <pc:sldChg chg="modSp">
+        <pc:chgData name="Osama hosam elde" userId="ab8f451e-a635-42ee-be12-e2dde55852bf" providerId="ADAL" clId="{D67B4E5B-1382-4A89-A69C-BC8F3049F1F7}" dt="2020-02-23T07:39:50.117" v="211" actId="20577"/>
+        <pc:sldMkLst>
+          <pc:docMk/>
+          <pc:sldMk cId="0" sldId="306"/>
+        </pc:sldMkLst>
+        <pc:spChg chg="mod">
+          <ac:chgData name="Osama hosam elde" userId="ab8f451e-a635-42ee-be12-e2dde55852bf" providerId="ADAL" clId="{D67B4E5B-1382-4A89-A69C-BC8F3049F1F7}" dt="2020-02-23T07:39:50.117" v="211" actId="20577"/>
+          <ac:spMkLst>
+            <pc:docMk/>
+            <pc:sldMk cId="0" sldId="306"/>
+            <ac:spMk id="75779" creationId="{00000000-0000-0000-0000-000000000000}"/>
+          </ac:spMkLst>
+        </pc:spChg>
+      </pc:sldChg>
+      <pc:sldChg chg="modSp">
+        <pc:chgData name="Osama hosam elde" userId="ab8f451e-a635-42ee-be12-e2dde55852bf" providerId="ADAL" clId="{D67B4E5B-1382-4A89-A69C-BC8F3049F1F7}" dt="2020-02-23T07:39:58.957" v="213" actId="20577"/>
+        <pc:sldMkLst>
+          <pc:docMk/>
+          <pc:sldMk cId="0" sldId="307"/>
+        </pc:sldMkLst>
+        <pc:spChg chg="mod">
+          <ac:chgData name="Osama hosam elde" userId="ab8f451e-a635-42ee-be12-e2dde55852bf" providerId="ADAL" clId="{D67B4E5B-1382-4A89-A69C-BC8F3049F1F7}" dt="2020-02-23T07:39:58.957" v="213" actId="20577"/>
+          <ac:spMkLst>
+            <pc:docMk/>
+            <pc:sldMk cId="0" sldId="307"/>
+            <ac:spMk id="76803" creationId="{00000000-0000-0000-0000-000000000000}"/>
+          </ac:spMkLst>
+        </pc:spChg>
+      </pc:sldChg>
+      <pc:sldChg chg="modSp">
+        <pc:chgData name="Osama hosam elde" userId="ab8f451e-a635-42ee-be12-e2dde55852bf" providerId="ADAL" clId="{D67B4E5B-1382-4A89-A69C-BC8F3049F1F7}" dt="2020-02-23T07:40:08.677" v="217" actId="20577"/>
+        <pc:sldMkLst>
+          <pc:docMk/>
+          <pc:sldMk cId="0" sldId="314"/>
+        </pc:sldMkLst>
+        <pc:spChg chg="mod">
+          <ac:chgData name="Osama hosam elde" userId="ab8f451e-a635-42ee-be12-e2dde55852bf" providerId="ADAL" clId="{D67B4E5B-1382-4A89-A69C-BC8F3049F1F7}" dt="2020-02-23T07:40:08.677" v="217" actId="20577"/>
+          <ac:spMkLst>
+            <pc:docMk/>
+            <pc:sldMk cId="0" sldId="314"/>
+            <ac:spMk id="89091" creationId="{00000000-0000-0000-0000-000000000000}"/>
+          </ac:spMkLst>
+        </pc:spChg>
+      </pc:sldChg>
+      <pc:sldChg chg="modSp">
+        <pc:chgData name="Osama hosam elde" userId="ab8f451e-a635-42ee-be12-e2dde55852bf" providerId="ADAL" clId="{D67B4E5B-1382-4A89-A69C-BC8F3049F1F7}" dt="2020-02-23T07:40:15.221" v="221" actId="20577"/>
+        <pc:sldMkLst>
+          <pc:docMk/>
+          <pc:sldMk cId="0" sldId="315"/>
+        </pc:sldMkLst>
+        <pc:spChg chg="mod">
+          <ac:chgData name="Osama hosam elde" userId="ab8f451e-a635-42ee-be12-e2dde55852bf" providerId="ADAL" clId="{D67B4E5B-1382-4A89-A69C-BC8F3049F1F7}" dt="2020-02-23T07:40:15.221" v="221" actId="20577"/>
+          <ac:spMkLst>
+            <pc:docMk/>
+            <pc:sldMk cId="0" sldId="315"/>
+            <ac:spMk id="90115" creationId="{00000000-0000-0000-0000-000000000000}"/>
+          </ac:spMkLst>
+        </pc:spChg>
+      </pc:sldChg>
+      <pc:sldChg chg="modSp">
+        <pc:chgData name="Osama hosam elde" userId="ab8f451e-a635-42ee-be12-e2dde55852bf" providerId="ADAL" clId="{D67B4E5B-1382-4A89-A69C-BC8F3049F1F7}" dt="2020-02-23T07:40:21.349" v="225" actId="20577"/>
+        <pc:sldMkLst>
+          <pc:docMk/>
+          <pc:sldMk cId="0" sldId="316"/>
+        </pc:sldMkLst>
+        <pc:spChg chg="mod">
+          <ac:chgData name="Osama hosam elde" userId="ab8f451e-a635-42ee-be12-e2dde55852bf" providerId="ADAL" clId="{D67B4E5B-1382-4A89-A69C-BC8F3049F1F7}" dt="2020-02-23T07:40:21.349" v="225" actId="20577"/>
+          <ac:spMkLst>
+            <pc:docMk/>
+            <pc:sldMk cId="0" sldId="316"/>
+            <ac:spMk id="91139" creationId="{00000000-0000-0000-0000-000000000000}"/>
+          </ac:spMkLst>
+        </pc:spChg>
+      </pc:sldChg>
+      <pc:sldChg chg="modSp">
+        <pc:chgData name="Osama hosam elde" userId="ab8f451e-a635-42ee-be12-e2dde55852bf" providerId="ADAL" clId="{D67B4E5B-1382-4A89-A69C-BC8F3049F1F7}" dt="2020-02-23T07:40:27.446" v="229" actId="20577"/>
+        <pc:sldMkLst>
+          <pc:docMk/>
+          <pc:sldMk cId="0" sldId="317"/>
+        </pc:sldMkLst>
+        <pc:spChg chg="mod">
+          <ac:chgData name="Osama hosam elde" userId="ab8f451e-a635-42ee-be12-e2dde55852bf" providerId="ADAL" clId="{D67B4E5B-1382-4A89-A69C-BC8F3049F1F7}" dt="2020-02-23T07:40:27.446" v="229" actId="20577"/>
+          <ac:spMkLst>
+            <pc:docMk/>
+            <pc:sldMk cId="0" sldId="317"/>
+            <ac:spMk id="92163" creationId="{00000000-0000-0000-0000-000000000000}"/>
+          </ac:spMkLst>
+        </pc:spChg>
+      </pc:sldChg>
+      <pc:sldChg chg="modSp">
+        <pc:chgData name="Osama hosam elde" userId="ab8f451e-a635-42ee-be12-e2dde55852bf" providerId="ADAL" clId="{D67B4E5B-1382-4A89-A69C-BC8F3049F1F7}" dt="2020-02-23T07:40:33.605" v="233" actId="20577"/>
+        <pc:sldMkLst>
+          <pc:docMk/>
+          <pc:sldMk cId="0" sldId="318"/>
+        </pc:sldMkLst>
+        <pc:spChg chg="mod">
+          <ac:chgData name="Osama hosam elde" userId="ab8f451e-a635-42ee-be12-e2dde55852bf" providerId="ADAL" clId="{D67B4E5B-1382-4A89-A69C-BC8F3049F1F7}" dt="2020-02-23T07:40:33.605" v="233" actId="20577"/>
+          <ac:spMkLst>
+            <pc:docMk/>
+            <pc:sldMk cId="0" sldId="318"/>
+            <ac:spMk id="93187" creationId="{00000000-0000-0000-0000-000000000000}"/>
+          </ac:spMkLst>
+        </pc:spChg>
+      </pc:sldChg>
+      <pc:sldChg chg="modSp">
+        <pc:chgData name="Osama hosam elde" userId="ab8f451e-a635-42ee-be12-e2dde55852bf" providerId="ADAL" clId="{D67B4E5B-1382-4A89-A69C-BC8F3049F1F7}" dt="2020-02-23T07:40:39.125" v="237" actId="20577"/>
+        <pc:sldMkLst>
+          <pc:docMk/>
+          <pc:sldMk cId="0" sldId="319"/>
+        </pc:sldMkLst>
+        <pc:spChg chg="mod">
+          <ac:chgData name="Osama hosam elde" userId="ab8f451e-a635-42ee-be12-e2dde55852bf" providerId="ADAL" clId="{D67B4E5B-1382-4A89-A69C-BC8F3049F1F7}" dt="2020-02-23T07:40:39.125" v="237" actId="20577"/>
+          <ac:spMkLst>
+            <pc:docMk/>
+            <pc:sldMk cId="0" sldId="319"/>
+            <ac:spMk id="94211" creationId="{00000000-0000-0000-0000-000000000000}"/>
+          </ac:spMkLst>
+        </pc:spChg>
+      </pc:sldChg>
+      <pc:sldChg chg="modSp">
+        <pc:chgData name="Osama hosam elde" userId="ab8f451e-a635-42ee-be12-e2dde55852bf" providerId="ADAL" clId="{D67B4E5B-1382-4A89-A69C-BC8F3049F1F7}" dt="2020-02-23T07:40:53.181" v="239" actId="20577"/>
+        <pc:sldMkLst>
+          <pc:docMk/>
+          <pc:sldMk cId="0" sldId="320"/>
+        </pc:sldMkLst>
+        <pc:spChg chg="mod">
+          <ac:chgData name="Osama hosam elde" userId="ab8f451e-a635-42ee-be12-e2dde55852bf" providerId="ADAL" clId="{D67B4E5B-1382-4A89-A69C-BC8F3049F1F7}" dt="2020-02-23T07:40:53.181" v="239" actId="20577"/>
+          <ac:spMkLst>
+            <pc:docMk/>
+            <pc:sldMk cId="0" sldId="320"/>
+            <ac:spMk id="95235" creationId="{00000000-0000-0000-0000-000000000000}"/>
+          </ac:spMkLst>
+        </pc:spChg>
+      </pc:sldChg>
+      <pc:sldChg chg="modSp">
+        <pc:chgData name="Osama hosam elde" userId="ab8f451e-a635-42ee-be12-e2dde55852bf" providerId="ADAL" clId="{D67B4E5B-1382-4A89-A69C-BC8F3049F1F7}" dt="2020-02-23T07:41:04.350" v="243" actId="20577"/>
+        <pc:sldMkLst>
+          <pc:docMk/>
+          <pc:sldMk cId="0" sldId="321"/>
+        </pc:sldMkLst>
+        <pc:spChg chg="mod">
+          <ac:chgData name="Osama hosam elde" userId="ab8f451e-a635-42ee-be12-e2dde55852bf" providerId="ADAL" clId="{D67B4E5B-1382-4A89-A69C-BC8F3049F1F7}" dt="2020-02-23T07:41:04.350" v="243" actId="20577"/>
+          <ac:spMkLst>
+            <pc:docMk/>
+            <pc:sldMk cId="0" sldId="321"/>
+            <ac:spMk id="96259" creationId="{00000000-0000-0000-0000-000000000000}"/>
+          </ac:spMkLst>
+        </pc:spChg>
+      </pc:sldChg>
+      <pc:sldChg chg="modSp">
+        <pc:chgData name="Osama hosam elde" userId="ab8f451e-a635-42ee-be12-e2dde55852bf" providerId="ADAL" clId="{D67B4E5B-1382-4A89-A69C-BC8F3049F1F7}" dt="2020-02-23T07:41:24.271" v="253" actId="20577"/>
+        <pc:sldMkLst>
+          <pc:docMk/>
+          <pc:sldMk cId="0" sldId="322"/>
+        </pc:sldMkLst>
+        <pc:spChg chg="mod">
+          <ac:chgData name="Osama hosam elde" userId="ab8f451e-a635-42ee-be12-e2dde55852bf" providerId="ADAL" clId="{D67B4E5B-1382-4A89-A69C-BC8F3049F1F7}" dt="2020-02-23T07:41:24.271" v="253" actId="20577"/>
+          <ac:spMkLst>
+            <pc:docMk/>
+            <pc:sldMk cId="0" sldId="322"/>
+            <ac:spMk id="98307" creationId="{00000000-0000-0000-0000-000000000000}"/>
+          </ac:spMkLst>
+        </pc:spChg>
+      </pc:sldChg>
+      <pc:sldChg chg="modSp">
+        <pc:chgData name="Osama hosam elde" userId="ab8f451e-a635-42ee-be12-e2dde55852bf" providerId="ADAL" clId="{D67B4E5B-1382-4A89-A69C-BC8F3049F1F7}" dt="2020-02-23T07:41:35.655" v="257" actId="20577"/>
+        <pc:sldMkLst>
+          <pc:docMk/>
+          <pc:sldMk cId="0" sldId="323"/>
+        </pc:sldMkLst>
+        <pc:spChg chg="mod">
+          <ac:chgData name="Osama hosam elde" userId="ab8f451e-a635-42ee-be12-e2dde55852bf" providerId="ADAL" clId="{D67B4E5B-1382-4A89-A69C-BC8F3049F1F7}" dt="2020-02-23T07:41:35.655" v="257" actId="20577"/>
+          <ac:spMkLst>
+            <pc:docMk/>
+            <pc:sldMk cId="0" sldId="323"/>
+            <ac:spMk id="99330" creationId="{00000000-0000-0000-0000-000000000000}"/>
+          </ac:spMkLst>
+        </pc:spChg>
+      </pc:sldChg>
+      <pc:sldChg chg="modSp">
+        <pc:chgData name="Osama hosam elde" userId="ab8f451e-a635-42ee-be12-e2dde55852bf" providerId="ADAL" clId="{D67B4E5B-1382-4A89-A69C-BC8F3049F1F7}" dt="2020-02-23T07:41:43.367" v="261" actId="20577"/>
+        <pc:sldMkLst>
+          <pc:docMk/>
+          <pc:sldMk cId="0" sldId="324"/>
+        </pc:sldMkLst>
+        <pc:spChg chg="mod">
+          <ac:chgData name="Osama hosam elde" userId="ab8f451e-a635-42ee-be12-e2dde55852bf" providerId="ADAL" clId="{D67B4E5B-1382-4A89-A69C-BC8F3049F1F7}" dt="2020-02-23T07:41:43.367" v="261" actId="20577"/>
+          <ac:spMkLst>
+            <pc:docMk/>
+            <pc:sldMk cId="0" sldId="324"/>
+            <ac:spMk id="100354" creationId="{00000000-0000-0000-0000-000000000000}"/>
+          </ac:spMkLst>
+        </pc:spChg>
+      </pc:sldChg>
+      <pc:sldChg chg="modSp">
+        <pc:chgData name="Osama hosam elde" userId="ab8f451e-a635-42ee-be12-e2dde55852bf" providerId="ADAL" clId="{D67B4E5B-1382-4A89-A69C-BC8F3049F1F7}" dt="2020-02-23T07:41:52.127" v="265" actId="20577"/>
+        <pc:sldMkLst>
+          <pc:docMk/>
+          <pc:sldMk cId="0" sldId="325"/>
+        </pc:sldMkLst>
+        <pc:spChg chg="mod">
+          <ac:chgData name="Osama hosam elde" userId="ab8f451e-a635-42ee-be12-e2dde55852bf" providerId="ADAL" clId="{D67B4E5B-1382-4A89-A69C-BC8F3049F1F7}" dt="2020-02-23T07:41:52.127" v="265" actId="20577"/>
+          <ac:spMkLst>
+            <pc:docMk/>
+            <pc:sldMk cId="0" sldId="325"/>
+            <ac:spMk id="101378" creationId="{00000000-0000-0000-0000-000000000000}"/>
+          </ac:spMkLst>
+        </pc:spChg>
+      </pc:sldChg>
+      <pc:sldChg chg="modSp">
+        <pc:chgData name="Osama hosam elde" userId="ab8f451e-a635-42ee-be12-e2dde55852bf" providerId="ADAL" clId="{D67B4E5B-1382-4A89-A69C-BC8F3049F1F7}" dt="2020-02-23T07:41:58.655" v="269" actId="20577"/>
+        <pc:sldMkLst>
+          <pc:docMk/>
+          <pc:sldMk cId="0" sldId="326"/>
+        </pc:sldMkLst>
+        <pc:spChg chg="mod">
+          <ac:chgData name="Osama hosam elde" userId="ab8f451e-a635-42ee-be12-e2dde55852bf" providerId="ADAL" clId="{D67B4E5B-1382-4A89-A69C-BC8F3049F1F7}" dt="2020-02-23T07:41:58.655" v="269" actId="20577"/>
+          <ac:spMkLst>
+            <pc:docMk/>
+            <pc:sldMk cId="0" sldId="326"/>
+            <ac:spMk id="102402" creationId="{00000000-0000-0000-0000-000000000000}"/>
+          </ac:spMkLst>
+        </pc:spChg>
+      </pc:sldChg>
+      <pc:sldChg chg="modSp">
+        <pc:chgData name="Osama hosam elde" userId="ab8f451e-a635-42ee-be12-e2dde55852bf" providerId="ADAL" clId="{D67B4E5B-1382-4A89-A69C-BC8F3049F1F7}" dt="2020-02-23T07:42:29.320" v="280" actId="20577"/>
+        <pc:sldMkLst>
+          <pc:docMk/>
+          <pc:sldMk cId="0" sldId="327"/>
+        </pc:sldMkLst>
+        <pc:spChg chg="mod">
+          <ac:chgData name="Osama hosam elde" userId="ab8f451e-a635-42ee-be12-e2dde55852bf" providerId="ADAL" clId="{D67B4E5B-1382-4A89-A69C-BC8F3049F1F7}" dt="2020-02-23T07:42:29.320" v="280" actId="20577"/>
+          <ac:spMkLst>
+            <pc:docMk/>
+            <pc:sldMk cId="0" sldId="327"/>
+            <ac:spMk id="103427" creationId="{00000000-0000-0000-0000-000000000000}"/>
+          </ac:spMkLst>
+        </pc:spChg>
+      </pc:sldChg>
+      <pc:sldChg chg="modSp">
+        <pc:chgData name="Osama hosam elde" userId="ab8f451e-a635-42ee-be12-e2dde55852bf" providerId="ADAL" clId="{D67B4E5B-1382-4A89-A69C-BC8F3049F1F7}" dt="2020-02-23T07:42:36.960" v="284" actId="20577"/>
+        <pc:sldMkLst>
+          <pc:docMk/>
+          <pc:sldMk cId="0" sldId="329"/>
+        </pc:sldMkLst>
+        <pc:spChg chg="mod">
+          <ac:chgData name="Osama hosam elde" userId="ab8f451e-a635-42ee-be12-e2dde55852bf" providerId="ADAL" clId="{D67B4E5B-1382-4A89-A69C-BC8F3049F1F7}" dt="2020-02-23T07:42:36.960" v="284" actId="20577"/>
+          <ac:spMkLst>
+            <pc:docMk/>
+            <pc:sldMk cId="0" sldId="329"/>
+            <ac:spMk id="105476" creationId="{00000000-0000-0000-0000-000000000000}"/>
+          </ac:spMkLst>
+        </pc:spChg>
+      </pc:sldChg>
+      <pc:sldChg chg="modSp">
+        <pc:chgData name="Osama hosam elde" userId="ab8f451e-a635-42ee-be12-e2dde55852bf" providerId="ADAL" clId="{D67B4E5B-1382-4A89-A69C-BC8F3049F1F7}" dt="2020-02-23T07:42:51.961" v="292" actId="20577"/>
+        <pc:sldMkLst>
+          <pc:docMk/>
+          <pc:sldMk cId="0" sldId="331"/>
+        </pc:sldMkLst>
+        <pc:spChg chg="mod">
+          <ac:chgData name="Osama hosam elde" userId="ab8f451e-a635-42ee-be12-e2dde55852bf" providerId="ADAL" clId="{D67B4E5B-1382-4A89-A69C-BC8F3049F1F7}" dt="2020-02-23T07:42:51.961" v="292" actId="20577"/>
+          <ac:spMkLst>
+            <pc:docMk/>
+            <pc:sldMk cId="0" sldId="331"/>
+            <ac:spMk id="108546" creationId="{00000000-0000-0000-0000-000000000000}"/>
+          </ac:spMkLst>
+        </pc:spChg>
+      </pc:sldChg>
+      <pc:sldChg chg="modSp">
+        <pc:chgData name="Osama hosam elde" userId="ab8f451e-a635-42ee-be12-e2dde55852bf" providerId="ADAL" clId="{D67B4E5B-1382-4A89-A69C-BC8F3049F1F7}" dt="2020-02-23T07:42:58.480" v="296" actId="20577"/>
+        <pc:sldMkLst>
+          <pc:docMk/>
+          <pc:sldMk cId="0" sldId="332"/>
+        </pc:sldMkLst>
+        <pc:spChg chg="mod">
+          <ac:chgData name="Osama hosam elde" userId="ab8f451e-a635-42ee-be12-e2dde55852bf" providerId="ADAL" clId="{D67B4E5B-1382-4A89-A69C-BC8F3049F1F7}" dt="2020-02-23T07:42:58.480" v="296" actId="20577"/>
+          <ac:spMkLst>
+            <pc:docMk/>
+            <pc:sldMk cId="0" sldId="332"/>
+            <ac:spMk id="109570" creationId="{00000000-0000-0000-0000-000000000000}"/>
+          </ac:spMkLst>
+        </pc:spChg>
+      </pc:sldChg>
+      <pc:sldChg chg="modSp">
+        <pc:chgData name="Osama hosam elde" userId="ab8f451e-a635-42ee-be12-e2dde55852bf" providerId="ADAL" clId="{D67B4E5B-1382-4A89-A69C-BC8F3049F1F7}" dt="2020-02-23T07:43:06.809" v="301" actId="14100"/>
+        <pc:sldMkLst>
+          <pc:docMk/>
+          <pc:sldMk cId="0" sldId="333"/>
+        </pc:sldMkLst>
+        <pc:spChg chg="mod">
+          <ac:chgData name="Osama hosam elde" userId="ab8f451e-a635-42ee-be12-e2dde55852bf" providerId="ADAL" clId="{D67B4E5B-1382-4A89-A69C-BC8F3049F1F7}" dt="2020-02-23T07:43:06.809" v="301" actId="14100"/>
+          <ac:spMkLst>
+            <pc:docMk/>
+            <pc:sldMk cId="0" sldId="333"/>
+            <ac:spMk id="110594" creationId="{00000000-0000-0000-0000-000000000000}"/>
+          </ac:spMkLst>
+        </pc:spChg>
+      </pc:sldChg>
+      <pc:sldChg chg="modSp">
+        <pc:chgData name="Osama hosam elde" userId="ab8f451e-a635-42ee-be12-e2dde55852bf" providerId="ADAL" clId="{D67B4E5B-1382-4A89-A69C-BC8F3049F1F7}" dt="2020-02-23T07:43:15.049" v="306" actId="14100"/>
+        <pc:sldMkLst>
+          <pc:docMk/>
+          <pc:sldMk cId="0" sldId="334"/>
+        </pc:sldMkLst>
+        <pc:spChg chg="mod">
+          <ac:chgData name="Osama hosam elde" userId="ab8f451e-a635-42ee-be12-e2dde55852bf" providerId="ADAL" clId="{D67B4E5B-1382-4A89-A69C-BC8F3049F1F7}" dt="2020-02-23T07:43:15.049" v="306" actId="14100"/>
+          <ac:spMkLst>
+            <pc:docMk/>
+            <pc:sldMk cId="0" sldId="334"/>
+            <ac:spMk id="111618" creationId="{00000000-0000-0000-0000-000000000000}"/>
+          </ac:spMkLst>
+        </pc:spChg>
+      </pc:sldChg>
+      <pc:sldChg chg="modSp">
+        <pc:chgData name="Osama hosam elde" userId="ab8f451e-a635-42ee-be12-e2dde55852bf" providerId="ADAL" clId="{D67B4E5B-1382-4A89-A69C-BC8F3049F1F7}" dt="2020-02-23T07:43:44.834" v="310" actId="20577"/>
+        <pc:sldMkLst>
+          <pc:docMk/>
+          <pc:sldMk cId="0" sldId="335"/>
+        </pc:sldMkLst>
+        <pc:spChg chg="mod">
+          <ac:chgData name="Osama hosam elde" userId="ab8f451e-a635-42ee-be12-e2dde55852bf" providerId="ADAL" clId="{D67B4E5B-1382-4A89-A69C-BC8F3049F1F7}" dt="2020-02-23T07:43:44.834" v="310" actId="20577"/>
+          <ac:spMkLst>
+            <pc:docMk/>
+            <pc:sldMk cId="0" sldId="335"/>
+            <ac:spMk id="112642" creationId="{00000000-0000-0000-0000-000000000000}"/>
+          </ac:spMkLst>
+        </pc:spChg>
+      </pc:sldChg>
+      <pc:sldChg chg="modSp">
+        <pc:chgData name="Osama hosam elde" userId="ab8f451e-a635-42ee-be12-e2dde55852bf" providerId="ADAL" clId="{D67B4E5B-1382-4A89-A69C-BC8F3049F1F7}" dt="2020-02-23T07:38:05.580" v="182" actId="11"/>
+        <pc:sldMkLst>
+          <pc:docMk/>
+          <pc:sldMk cId="0" sldId="338"/>
+        </pc:sldMkLst>
+        <pc:spChg chg="mod">
+          <ac:chgData name="Osama hosam elde" userId="ab8f451e-a635-42ee-be12-e2dde55852bf" providerId="ADAL" clId="{D67B4E5B-1382-4A89-A69C-BC8F3049F1F7}" dt="2020-02-23T07:38:05.580" v="182" actId="11"/>
+          <ac:spMkLst>
+            <pc:docMk/>
+            <pc:sldMk cId="0" sldId="338"/>
+            <ac:spMk id="54274" creationId="{00000000-0000-0000-0000-000000000000}"/>
+          </ac:spMkLst>
+        </pc:spChg>
+      </pc:sldChg>
+      <pc:sldChg chg="modSp">
+        <pc:chgData name="Osama hosam elde" userId="ab8f451e-a635-42ee-be12-e2dde55852bf" providerId="ADAL" clId="{D67B4E5B-1382-4A89-A69C-BC8F3049F1F7}" dt="2020-02-23T07:38:39.939" v="190" actId="20577"/>
+        <pc:sldMkLst>
+          <pc:docMk/>
+          <pc:sldMk cId="0" sldId="339"/>
+        </pc:sldMkLst>
+        <pc:spChg chg="mod">
+          <ac:chgData name="Osama hosam elde" userId="ab8f451e-a635-42ee-be12-e2dde55852bf" providerId="ADAL" clId="{D67B4E5B-1382-4A89-A69C-BC8F3049F1F7}" dt="2020-02-23T07:38:39.939" v="190" actId="20577"/>
+          <ac:spMkLst>
+            <pc:docMk/>
+            <pc:sldMk cId="0" sldId="339"/>
+            <ac:spMk id="59395" creationId="{00000000-0000-0000-0000-000000000000}"/>
+          </ac:spMkLst>
+        </pc:spChg>
+      </pc:sldChg>
+      <pc:sldChg chg="modSp">
+        <pc:chgData name="Osama hosam elde" userId="ab8f451e-a635-42ee-be12-e2dde55852bf" providerId="ADAL" clId="{D67B4E5B-1382-4A89-A69C-BC8F3049F1F7}" dt="2020-02-23T07:38:49.690" v="193" actId="14100"/>
+        <pc:sldMkLst>
+          <pc:docMk/>
+          <pc:sldMk cId="0" sldId="340"/>
+        </pc:sldMkLst>
+        <pc:spChg chg="mod">
+          <ac:chgData name="Osama hosam elde" userId="ab8f451e-a635-42ee-be12-e2dde55852bf" providerId="ADAL" clId="{D67B4E5B-1382-4A89-A69C-BC8F3049F1F7}" dt="2020-02-23T07:38:49.690" v="193" actId="14100"/>
+          <ac:spMkLst>
+            <pc:docMk/>
+            <pc:sldMk cId="0" sldId="340"/>
+            <ac:spMk id="66562" creationId="{00000000-0000-0000-0000-000000000000}"/>
+          </ac:spMkLst>
+        </pc:spChg>
+      </pc:sldChg>
+      <pc:sldChg chg="modSp">
+        <pc:chgData name="Osama hosam elde" userId="ab8f451e-a635-42ee-be12-e2dde55852bf" providerId="ADAL" clId="{D67B4E5B-1382-4A89-A69C-BC8F3049F1F7}" dt="2020-02-23T07:38:54.740" v="195" actId="20577"/>
+        <pc:sldMkLst>
+          <pc:docMk/>
+          <pc:sldMk cId="0" sldId="341"/>
+        </pc:sldMkLst>
+        <pc:spChg chg="mod">
+          <ac:chgData name="Osama hosam elde" userId="ab8f451e-a635-42ee-be12-e2dde55852bf" providerId="ADAL" clId="{D67B4E5B-1382-4A89-A69C-BC8F3049F1F7}" dt="2020-02-23T07:38:54.740" v="195" actId="20577"/>
+          <ac:spMkLst>
+            <pc:docMk/>
+            <pc:sldMk cId="0" sldId="341"/>
+            <ac:spMk id="67586" creationId="{00000000-0000-0000-0000-000000000000}"/>
+          </ac:spMkLst>
+        </pc:spChg>
+      </pc:sldChg>
+      <pc:sldChg chg="modSp">
+        <pc:chgData name="Osama hosam elde" userId="ab8f451e-a635-42ee-be12-e2dde55852bf" providerId="ADAL" clId="{D67B4E5B-1382-4A89-A69C-BC8F3049F1F7}" dt="2020-02-23T07:39:01.595" v="197" actId="20577"/>
+        <pc:sldMkLst>
+          <pc:docMk/>
+          <pc:sldMk cId="0" sldId="342"/>
+        </pc:sldMkLst>
+        <pc:spChg chg="mod">
+          <ac:chgData name="Osama hosam elde" userId="ab8f451e-a635-42ee-be12-e2dde55852bf" providerId="ADAL" clId="{D67B4E5B-1382-4A89-A69C-BC8F3049F1F7}" dt="2020-02-23T07:39:01.595" v="197" actId="20577"/>
+          <ac:spMkLst>
+            <pc:docMk/>
+            <pc:sldMk cId="0" sldId="342"/>
+            <ac:spMk id="68610" creationId="{00000000-0000-0000-0000-000000000000}"/>
+          </ac:spMkLst>
+        </pc:spChg>
+      </pc:sldChg>
+      <pc:sldChg chg="modSp">
+        <pc:chgData name="Osama hosam elde" userId="ab8f451e-a635-42ee-be12-e2dde55852bf" providerId="ADAL" clId="{D67B4E5B-1382-4A89-A69C-BC8F3049F1F7}" dt="2020-02-23T07:40:04.356" v="215" actId="20577"/>
+        <pc:sldMkLst>
+          <pc:docMk/>
+          <pc:sldMk cId="0" sldId="343"/>
+        </pc:sldMkLst>
+        <pc:spChg chg="mod">
+          <ac:chgData name="Osama hosam elde" userId="ab8f451e-a635-42ee-be12-e2dde55852bf" providerId="ADAL" clId="{D67B4E5B-1382-4A89-A69C-BC8F3049F1F7}" dt="2020-02-23T07:40:04.356" v="215" actId="20577"/>
+          <ac:spMkLst>
+            <pc:docMk/>
+            <pc:sldMk cId="0" sldId="343"/>
+            <ac:spMk id="77827" creationId="{00000000-0000-0000-0000-000000000000}"/>
+          </ac:spMkLst>
+        </pc:spChg>
+      </pc:sldChg>
+      <pc:sldChg chg="modSp">
+        <pc:chgData name="Osama hosam elde" userId="ab8f451e-a635-42ee-be12-e2dde55852bf" providerId="ADAL" clId="{D67B4E5B-1382-4A89-A69C-BC8F3049F1F7}" dt="2020-02-23T07:42:46.408" v="288" actId="20577"/>
+        <pc:sldMkLst>
+          <pc:docMk/>
+          <pc:sldMk cId="0" sldId="345"/>
+        </pc:sldMkLst>
+        <pc:spChg chg="mod">
+          <ac:chgData name="Osama hosam elde" userId="ab8f451e-a635-42ee-be12-e2dde55852bf" providerId="ADAL" clId="{D67B4E5B-1382-4A89-A69C-BC8F3049F1F7}" dt="2020-02-23T07:42:46.408" v="288" actId="20577"/>
+          <ac:spMkLst>
+            <pc:docMk/>
+            <pc:sldMk cId="0" sldId="345"/>
+            <ac:spMk id="107522" creationId="{00000000-0000-0000-0000-000000000000}"/>
+          </ac:spMkLst>
+        </pc:spChg>
+      </pc:sldChg>
+      <pc:sldChg chg="modSp">
+        <pc:chgData name="Osama hosam elde" userId="ab8f451e-a635-42ee-be12-e2dde55852bf" providerId="ADAL" clId="{D67B4E5B-1382-4A89-A69C-BC8F3049F1F7}" dt="2020-02-23T07:39:15.739" v="201" actId="20577"/>
+        <pc:sldMkLst>
+          <pc:docMk/>
+          <pc:sldMk cId="0" sldId="352"/>
+        </pc:sldMkLst>
+        <pc:spChg chg="mod">
+          <ac:chgData name="Osama hosam elde" userId="ab8f451e-a635-42ee-be12-e2dde55852bf" providerId="ADAL" clId="{D67B4E5B-1382-4A89-A69C-BC8F3049F1F7}" dt="2020-02-23T07:39:15.739" v="201" actId="20577"/>
+          <ac:spMkLst>
+            <pc:docMk/>
+            <pc:sldMk cId="0" sldId="352"/>
+            <ac:spMk id="70659" creationId="{00000000-0000-0000-0000-000000000000}"/>
+          </ac:spMkLst>
+        </pc:spChg>
+      </pc:sldChg>
+      <pc:sldChg chg="modSp">
+        <pc:chgData name="Osama hosam elde" userId="ab8f451e-a635-42ee-be12-e2dde55852bf" providerId="ADAL" clId="{D67B4E5B-1382-4A89-A69C-BC8F3049F1F7}" dt="2020-02-23T07:39:21.619" v="203" actId="20577"/>
+        <pc:sldMkLst>
+          <pc:docMk/>
+          <pc:sldMk cId="0" sldId="353"/>
+        </pc:sldMkLst>
+        <pc:spChg chg="mod">
+          <ac:chgData name="Osama hosam elde" userId="ab8f451e-a635-42ee-be12-e2dde55852bf" providerId="ADAL" clId="{D67B4E5B-1382-4A89-A69C-BC8F3049F1F7}" dt="2020-02-23T07:39:21.619" v="203" actId="20577"/>
+          <ac:spMkLst>
+            <pc:docMk/>
+            <pc:sldMk cId="0" sldId="353"/>
+            <ac:spMk id="71683" creationId="{00000000-0000-0000-0000-000000000000}"/>
+          </ac:spMkLst>
+        </pc:spChg>
+      </pc:sldChg>
+      <pc:sldChg chg="modSp">
+        <pc:chgData name="Osama hosam elde" userId="ab8f451e-a635-42ee-be12-e2dde55852bf" providerId="ADAL" clId="{D67B4E5B-1382-4A89-A69C-BC8F3049F1F7}" dt="2020-02-23T07:41:15.111" v="249" actId="20577"/>
+        <pc:sldMkLst>
+          <pc:docMk/>
+          <pc:sldMk cId="0" sldId="355"/>
+        </pc:sldMkLst>
+        <pc:spChg chg="mod">
+          <ac:chgData name="Osama hosam elde" userId="ab8f451e-a635-42ee-be12-e2dde55852bf" providerId="ADAL" clId="{D67B4E5B-1382-4A89-A69C-BC8F3049F1F7}" dt="2020-02-23T07:41:15.111" v="249" actId="20577"/>
+          <ac:spMkLst>
+            <pc:docMk/>
+            <pc:sldMk cId="0" sldId="355"/>
+            <ac:spMk id="97283" creationId="{00000000-0000-0000-0000-000000000000}"/>
+          </ac:spMkLst>
+        </pc:spChg>
+      </pc:sldChg>
+    </pc:docChg>
+  </pc:docChgLst>
   <pc:docChgLst>
     <pc:chgData name="Osama Mohammed Moustafa Hosam Elde" userId="ab8f451e-a635-42ee-be12-e2dde55852bf" providerId="ADAL" clId="{02E1D72D-6DE0-46BC-BEC0-7B9CD0A4C269}"/>
     <pc:docChg chg="undo addSld delSld modSld">
@@ -443,7 +1050,7 @@
               <a:pPr>
                 <a:defRPr/>
               </a:pPr>
-              <a:t>12/31/2019</a:t>
+              <a:t>2/23/2020</a:t>
             </a:fld>
             <a:endParaRPr lang="en-US"/>
           </a:p>
@@ -1140,7 +1747,7 @@
               <a:pPr>
                 <a:defRPr/>
               </a:pPr>
-              <a:t>12/31/2019</a:t>
+              <a:t>2/23/2020</a:t>
             </a:fld>
             <a:endParaRPr lang="en-US"/>
           </a:p>
@@ -1343,7 +1950,7 @@
               <a:pPr>
                 <a:defRPr/>
               </a:pPr>
-              <a:t>12/31/2019</a:t>
+              <a:t>2/23/2020</a:t>
             </a:fld>
             <a:endParaRPr lang="en-US"/>
           </a:p>
@@ -1546,7 +2153,7 @@
               <a:pPr>
                 <a:defRPr/>
               </a:pPr>
-              <a:t>12/31/2019</a:t>
+              <a:t>2/23/2020</a:t>
             </a:fld>
             <a:endParaRPr lang="en-US"/>
           </a:p>
@@ -1811,7 +2418,7 @@
               <a:pPr>
                 <a:defRPr/>
               </a:pPr>
-              <a:t>12/31/2019</a:t>
+              <a:t>2/23/2020</a:t>
             </a:fld>
             <a:endParaRPr lang="en-US"/>
           </a:p>
@@ -2004,7 +2611,7 @@
               <a:pPr>
                 <a:defRPr/>
               </a:pPr>
-              <a:t>12/31/2019</a:t>
+              <a:t>2/23/2020</a:t>
             </a:fld>
             <a:endParaRPr lang="en-US"/>
           </a:p>
@@ -2274,7 +2881,7 @@
               <a:pPr>
                 <a:defRPr/>
               </a:pPr>
-              <a:t>12/31/2019</a:t>
+              <a:t>2/23/2020</a:t>
             </a:fld>
             <a:endParaRPr lang="en-US"/>
           </a:p>
@@ -2584,7 +3191,7 @@
               <a:pPr>
                 <a:defRPr/>
               </a:pPr>
-              <a:t>12/31/2019</a:t>
+              <a:t>2/23/2020</a:t>
             </a:fld>
             <a:endParaRPr lang="en-US"/>
           </a:p>
@@ -3028,7 +3635,7 @@
               <a:pPr>
                 <a:defRPr/>
               </a:pPr>
-              <a:t>12/31/2019</a:t>
+              <a:t>2/23/2020</a:t>
             </a:fld>
             <a:endParaRPr lang="en-US"/>
           </a:p>
@@ -3170,7 +3777,7 @@
               <a:pPr>
                 <a:defRPr/>
               </a:pPr>
-              <a:t>12/31/2019</a:t>
+              <a:t>2/23/2020</a:t>
             </a:fld>
             <a:endParaRPr lang="en-US"/>
           </a:p>
@@ -3290,7 +3897,7 @@
               <a:pPr>
                 <a:defRPr/>
               </a:pPr>
-              <a:t>12/31/2019</a:t>
+              <a:t>2/23/2020</a:t>
             </a:fld>
             <a:endParaRPr lang="en-US"/>
           </a:p>
@@ -3590,7 +4197,7 @@
               <a:pPr>
                 <a:defRPr/>
               </a:pPr>
-              <a:t>12/31/2019</a:t>
+              <a:t>2/23/2020</a:t>
             </a:fld>
             <a:endParaRPr lang="en-US"/>
           </a:p>
@@ -3855,7 +4462,7 @@
               <a:pPr>
                 <a:defRPr/>
               </a:pPr>
-              <a:t>12/31/2019</a:t>
+              <a:t>2/23/2020</a:t>
             </a:fld>
             <a:endParaRPr lang="en-US"/>
           </a:p>
@@ -4139,7 +4746,7 @@
               <a:pPr>
                 <a:defRPr/>
               </a:pPr>
-              <a:t>12/31/2019</a:t>
+              <a:t>2/23/2020</a:t>
             </a:fld>
             <a:endParaRPr lang="en-US"/>
           </a:p>
@@ -4332,7 +4939,7 @@
               <a:pPr>
                 <a:defRPr/>
               </a:pPr>
-              <a:t>12/31/2019</a:t>
+              <a:t>2/23/2020</a:t>
             </a:fld>
             <a:endParaRPr lang="en-US"/>
           </a:p>
@@ -4535,7 +5142,7 @@
               <a:pPr>
                 <a:defRPr/>
               </a:pPr>
-              <a:t>12/31/2019</a:t>
+              <a:t>2/23/2020</a:t>
             </a:fld>
             <a:endParaRPr lang="en-US"/>
           </a:p>
@@ -4800,7 +5407,7 @@
               <a:pPr>
                 <a:defRPr/>
               </a:pPr>
-              <a:t>12/31/2019</a:t>
+              <a:t>2/23/2020</a:t>
             </a:fld>
             <a:endParaRPr lang="en-US"/>
           </a:p>
@@ -4993,7 +5600,7 @@
               <a:pPr>
                 <a:defRPr/>
               </a:pPr>
-              <a:t>12/31/2019</a:t>
+              <a:t>2/23/2020</a:t>
             </a:fld>
             <a:endParaRPr lang="en-US"/>
           </a:p>
@@ -5263,7 +5870,7 @@
               <a:pPr>
                 <a:defRPr/>
               </a:pPr>
-              <a:t>12/31/2019</a:t>
+              <a:t>2/23/2020</a:t>
             </a:fld>
             <a:endParaRPr lang="en-US"/>
           </a:p>
@@ -5573,7 +6180,7 @@
               <a:pPr>
                 <a:defRPr/>
               </a:pPr>
-              <a:t>12/31/2019</a:t>
+              <a:t>2/23/2020</a:t>
             </a:fld>
             <a:endParaRPr lang="en-US"/>
           </a:p>
@@ -6017,7 +6624,7 @@
               <a:pPr>
                 <a:defRPr/>
               </a:pPr>
-              <a:t>12/31/2019</a:t>
+              <a:t>2/23/2020</a:t>
             </a:fld>
             <a:endParaRPr lang="en-US"/>
           </a:p>
@@ -6159,7 +6766,7 @@
               <a:pPr>
                 <a:defRPr/>
               </a:pPr>
-              <a:t>12/31/2019</a:t>
+              <a:t>2/23/2020</a:t>
             </a:fld>
             <a:endParaRPr lang="en-US"/>
           </a:p>
@@ -6279,7 +6886,7 @@
               <a:pPr>
                 <a:defRPr/>
               </a:pPr>
-              <a:t>12/31/2019</a:t>
+              <a:t>2/23/2020</a:t>
             </a:fld>
             <a:endParaRPr lang="en-US"/>
           </a:p>
@@ -6549,7 +7156,7 @@
               <a:pPr>
                 <a:defRPr/>
               </a:pPr>
-              <a:t>12/31/2019</a:t>
+              <a:t>2/23/2020</a:t>
             </a:fld>
             <a:endParaRPr lang="en-US"/>
           </a:p>
@@ -6849,7 +7456,7 @@
               <a:pPr>
                 <a:defRPr/>
               </a:pPr>
-              <a:t>12/31/2019</a:t>
+              <a:t>2/23/2020</a:t>
             </a:fld>
             <a:endParaRPr lang="en-US"/>
           </a:p>
@@ -7129,7 +7736,7 @@
               <a:pPr>
                 <a:defRPr/>
               </a:pPr>
-              <a:t>12/31/2019</a:t>
+              <a:t>2/23/2020</a:t>
             </a:fld>
             <a:endParaRPr lang="en-US"/>
           </a:p>
@@ -7322,7 +7929,7 @@
               <a:pPr>
                 <a:defRPr/>
               </a:pPr>
-              <a:t>12/31/2019</a:t>
+              <a:t>2/23/2020</a:t>
             </a:fld>
             <a:endParaRPr lang="en-US"/>
           </a:p>
@@ -7525,7 +8132,7 @@
               <a:pPr>
                 <a:defRPr/>
               </a:pPr>
-              <a:t>12/31/2019</a:t>
+              <a:t>2/23/2020</a:t>
             </a:fld>
             <a:endParaRPr lang="en-US"/>
           </a:p>
@@ -7790,7 +8397,7 @@
               <a:pPr>
                 <a:defRPr/>
               </a:pPr>
-              <a:t>12/31/2019</a:t>
+              <a:t>2/23/2020</a:t>
             </a:fld>
             <a:endParaRPr lang="en-US"/>
           </a:p>
@@ -7983,7 +8590,7 @@
               <a:pPr>
                 <a:defRPr/>
               </a:pPr>
-              <a:t>12/31/2019</a:t>
+              <a:t>2/23/2020</a:t>
             </a:fld>
             <a:endParaRPr lang="en-US"/>
           </a:p>
@@ -8253,7 +8860,7 @@
               <a:pPr>
                 <a:defRPr/>
               </a:pPr>
-              <a:t>12/31/2019</a:t>
+              <a:t>2/23/2020</a:t>
             </a:fld>
             <a:endParaRPr lang="en-US"/>
           </a:p>
@@ -8563,7 +9170,7 @@
               <a:pPr>
                 <a:defRPr/>
               </a:pPr>
-              <a:t>12/31/2019</a:t>
+              <a:t>2/23/2020</a:t>
             </a:fld>
             <a:endParaRPr lang="en-US"/>
           </a:p>
@@ -9007,7 +9614,7 @@
               <a:pPr>
                 <a:defRPr/>
               </a:pPr>
-              <a:t>12/31/2019</a:t>
+              <a:t>2/23/2020</a:t>
             </a:fld>
             <a:endParaRPr lang="en-US"/>
           </a:p>
@@ -9149,7 +9756,7 @@
               <a:pPr>
                 <a:defRPr/>
               </a:pPr>
-              <a:t>12/31/2019</a:t>
+              <a:t>2/23/2020</a:t>
             </a:fld>
             <a:endParaRPr lang="en-US"/>
           </a:p>
@@ -9459,7 +10066,7 @@
               <a:pPr>
                 <a:defRPr/>
               </a:pPr>
-              <a:t>12/31/2019</a:t>
+              <a:t>2/23/2020</a:t>
             </a:fld>
             <a:endParaRPr lang="en-US"/>
           </a:p>
@@ -9579,7 +10186,7 @@
               <a:pPr>
                 <a:defRPr/>
               </a:pPr>
-              <a:t>12/31/2019</a:t>
+              <a:t>2/23/2020</a:t>
             </a:fld>
             <a:endParaRPr lang="en-US"/>
           </a:p>
@@ -9879,7 +10486,7 @@
               <a:pPr>
                 <a:defRPr/>
               </a:pPr>
-              <a:t>12/31/2019</a:t>
+              <a:t>2/23/2020</a:t>
             </a:fld>
             <a:endParaRPr lang="en-US"/>
           </a:p>
@@ -10159,7 +10766,7 @@
               <a:pPr>
                 <a:defRPr/>
               </a:pPr>
-              <a:t>12/31/2019</a:t>
+              <a:t>2/23/2020</a:t>
             </a:fld>
             <a:endParaRPr lang="en-US"/>
           </a:p>
@@ -10352,7 +10959,7 @@
               <a:pPr>
                 <a:defRPr/>
               </a:pPr>
-              <a:t>12/31/2019</a:t>
+              <a:t>2/23/2020</a:t>
             </a:fld>
             <a:endParaRPr lang="en-US"/>
           </a:p>
@@ -10555,7 +11162,7 @@
               <a:pPr>
                 <a:defRPr/>
               </a:pPr>
-              <a:t>12/31/2019</a:t>
+              <a:t>2/23/2020</a:t>
             </a:fld>
             <a:endParaRPr lang="en-US"/>
           </a:p>
@@ -10999,7 +11606,7 @@
               <a:pPr>
                 <a:defRPr/>
               </a:pPr>
-              <a:t>12/31/2019</a:t>
+              <a:t>2/23/2020</a:t>
             </a:fld>
             <a:endParaRPr lang="en-US"/>
           </a:p>
@@ -11141,7 +11748,7 @@
               <a:pPr>
                 <a:defRPr/>
               </a:pPr>
-              <a:t>12/31/2019</a:t>
+              <a:t>2/23/2020</a:t>
             </a:fld>
             <a:endParaRPr lang="en-US"/>
           </a:p>
@@ -11261,7 +11868,7 @@
               <a:pPr>
                 <a:defRPr/>
               </a:pPr>
-              <a:t>12/31/2019</a:t>
+              <a:t>2/23/2020</a:t>
             </a:fld>
             <a:endParaRPr lang="en-US"/>
           </a:p>
@@ -11561,7 +12168,7 @@
               <a:pPr>
                 <a:defRPr/>
               </a:pPr>
-              <a:t>12/31/2019</a:t>
+              <a:t>2/23/2020</a:t>
             </a:fld>
             <a:endParaRPr lang="en-US"/>
           </a:p>
@@ -11841,7 +12448,7 @@
               <a:pPr>
                 <a:defRPr/>
               </a:pPr>
-              <a:t>12/31/2019</a:t>
+              <a:t>2/23/2020</a:t>
             </a:fld>
             <a:endParaRPr lang="en-US"/>
           </a:p>
@@ -12137,7 +12744,7 @@
               <a:pPr>
                 <a:defRPr/>
               </a:pPr>
-              <a:t>12/31/2019</a:t>
+              <a:t>2/23/2020</a:t>
             </a:fld>
             <a:endParaRPr lang="en-US"/>
           </a:p>
@@ -12825,7 +13432,7 @@
               <a:pPr>
                 <a:defRPr/>
               </a:pPr>
-              <a:t>12/31/2019</a:t>
+              <a:t>2/23/2020</a:t>
             </a:fld>
             <a:endParaRPr lang="en-US"/>
           </a:p>
@@ -13509,7 +14116,7 @@
               <a:pPr>
                 <a:defRPr/>
               </a:pPr>
-              <a:t>12/31/2019</a:t>
+              <a:t>2/23/2020</a:t>
             </a:fld>
             <a:endParaRPr lang="en-US"/>
           </a:p>
@@ -14193,7 +14800,7 @@
               <a:pPr>
                 <a:defRPr/>
               </a:pPr>
-              <a:t>12/31/2019</a:t>
+              <a:t>2/23/2020</a:t>
             </a:fld>
             <a:endParaRPr lang="en-US"/>
           </a:p>
@@ -15071,8 +15678,8 @@
           <a:p>
             <a:pPr eaLnBrk="1" hangingPunct="1"/>
             <a:r>
-              <a:rPr lang="en-US"/>
-              <a:t>CIM Principles</a:t>
+              <a:rPr lang="en-US" dirty="0"/>
+              <a:t>2 CIM Principles</a:t>
             </a:r>
           </a:p>
         </p:txBody>
@@ -15218,8 +15825,8 @@
           <a:p>
             <a:pPr eaLnBrk="1" hangingPunct="1"/>
             <a:r>
-              <a:rPr lang="en-US"/>
-              <a:t>CIM Model</a:t>
+              <a:rPr lang="en-US" dirty="0"/>
+              <a:t>2 CIM Model</a:t>
             </a:r>
           </a:p>
         </p:txBody>
@@ -15421,8 +16028,8 @@
           <a:p>
             <a:pPr eaLnBrk="1" hangingPunct="1"/>
             <a:r>
-              <a:rPr lang="en-US"/>
-              <a:t>CIM Model – Identify Opportunities</a:t>
+              <a:rPr lang="en-US" dirty="0"/>
+              <a:t>2 CIM Model – Identify Opportunities</a:t>
             </a:r>
           </a:p>
         </p:txBody>
@@ -15614,8 +16221,8 @@
           <a:p>
             <a:pPr eaLnBrk="1" hangingPunct="1"/>
             <a:r>
-              <a:rPr lang="en-US"/>
-              <a:t>CIM Model – Identify Opportunities</a:t>
+              <a:rPr lang="en-US" dirty="0"/>
+              <a:t>2 CIM Model – Identify Opportunities</a:t>
             </a:r>
           </a:p>
         </p:txBody>
@@ -15729,34 +16336,34 @@
           <a:p>
             <a:pPr eaLnBrk="1" hangingPunct="1"/>
             <a:r>
-              <a:rPr lang="en-US" sz="2400"/>
+              <a:rPr lang="en-US" sz="2400" dirty="0"/>
               <a:t>Team formation is critical to the success of a project.</a:t>
             </a:r>
           </a:p>
           <a:p>
             <a:pPr eaLnBrk="1" hangingPunct="1"/>
             <a:r>
-              <a:rPr lang="en-US" sz="2400"/>
+              <a:rPr lang="en-US" sz="2400" dirty="0"/>
               <a:t>This process helps to clarify roles and responsibilities and designate initial members of a project. </a:t>
             </a:r>
           </a:p>
           <a:p>
             <a:pPr eaLnBrk="1" hangingPunct="1"/>
             <a:r>
-              <a:rPr lang="en-US" sz="2400"/>
+              <a:rPr lang="en-US" sz="2400" dirty="0"/>
               <a:t>Using team resources, requirements from customer need to be analyzed to establish the scope of a project.</a:t>
             </a:r>
           </a:p>
           <a:p>
             <a:pPr eaLnBrk="1" hangingPunct="1"/>
             <a:r>
-              <a:rPr lang="en-US" sz="2400"/>
+              <a:rPr lang="en-US" sz="2400" dirty="0"/>
               <a:t>Using the scope of a project, a clear purpose of the project has to be developed.</a:t>
             </a:r>
           </a:p>
           <a:p>
             <a:pPr eaLnBrk="1" hangingPunct="1"/>
-            <a:endParaRPr lang="en-US" sz="2400"/>
+            <a:endParaRPr lang="en-US" sz="2400" dirty="0"/>
           </a:p>
         </p:txBody>
       </p:sp>
@@ -15782,8 +16389,8 @@
           <a:p>
             <a:pPr eaLnBrk="1" hangingPunct="1"/>
             <a:r>
-              <a:rPr lang="en-US"/>
-              <a:t>CIM Model – Form Team and Create Scope</a:t>
+              <a:rPr lang="en-US" dirty="0"/>
+              <a:t>2 CIM Model – Form Team and Create Scope</a:t>
             </a:r>
           </a:p>
         </p:txBody>
@@ -15979,8 +16586,8 @@
           <a:p>
             <a:pPr eaLnBrk="1" hangingPunct="1"/>
             <a:r>
-              <a:rPr lang="en-US"/>
-              <a:t>CIM Model – Form Team and Create Scope</a:t>
+              <a:rPr lang="en-US" dirty="0"/>
+              <a:t>2 CIM Model – Form Team and Create Scope</a:t>
             </a:r>
           </a:p>
         </p:txBody>
@@ -16149,8 +16756,8 @@
           <a:p>
             <a:pPr eaLnBrk="1" hangingPunct="1"/>
             <a:r>
-              <a:rPr lang="en-US"/>
-              <a:t>CIM Model – Analyze “as-is” and determine “to-be”</a:t>
+              <a:rPr lang="en-US" dirty="0"/>
+              <a:t>2 CIM Model – Analyze “as-is” and determine “to-be”</a:t>
             </a:r>
           </a:p>
         </p:txBody>
@@ -16352,8 +16959,8 @@
           <a:p>
             <a:pPr eaLnBrk="1" hangingPunct="1"/>
             <a:r>
-              <a:rPr lang="en-US"/>
-              <a:t>CIM Model – Identify root-causes &amp; proposed solutions</a:t>
+              <a:rPr lang="en-US" dirty="0"/>
+              <a:t>2 CIM Model – Identify root-causes &amp; proposed solutions</a:t>
             </a:r>
           </a:p>
         </p:txBody>
@@ -16527,8 +17134,8 @@
           <a:p>
             <a:pPr eaLnBrk="1" hangingPunct="1"/>
             <a:r>
-              <a:rPr lang="en-US"/>
-              <a:t>CIM Model – Implementation, Progress, Closure</a:t>
+              <a:rPr lang="en-US" dirty="0"/>
+              <a:t>2 CIM Model – Implementation, Progress, Closure</a:t>
             </a:r>
           </a:p>
         </p:txBody>
@@ -16684,8 +17291,8 @@
           <a:p>
             <a:pPr eaLnBrk="1" hangingPunct="1"/>
             <a:r>
-              <a:rPr lang="en-US"/>
-              <a:t>Six Sigma</a:t>
+              <a:rPr lang="en-US" dirty="0"/>
+              <a:t>3 Six Sigma</a:t>
             </a:r>
           </a:p>
         </p:txBody>
@@ -16797,32 +17404,54 @@
           <a:bodyPr/>
           <a:lstStyle/>
           <a:p>
-            <a:pPr eaLnBrk="1" hangingPunct="1"/>
+            <a:pPr marL="457200" indent="-457200" eaLnBrk="1" hangingPunct="1">
+              <a:buFont typeface="+mj-lt"/>
+              <a:buAutoNum type="arabicPeriod"/>
+            </a:pPr>
             <a:r>
               <a:rPr lang="en-US" sz="2400" dirty="0"/>
               <a:t>Define project process and how organizations benefit from adopting those processes oriented towards customer satisfaction.</a:t>
             </a:r>
           </a:p>
           <a:p>
-            <a:pPr eaLnBrk="1" hangingPunct="1"/>
-            <a:r>
-              <a:rPr lang="en-US" sz="2400" dirty="0"/>
-              <a:t>Understand PMBOK® project management processes and how project activities are mapped to these processes for successful project management.</a:t>
-            </a:r>
-          </a:p>
-          <a:p>
-            <a:pPr eaLnBrk="1" hangingPunct="1"/>
+            <a:pPr marL="457200" indent="-457200" eaLnBrk="1" hangingPunct="1">
+              <a:buFont typeface="+mj-lt"/>
+              <a:buAutoNum type="arabicPeriod"/>
+            </a:pPr>
             <a:r>
               <a:rPr lang="en-US" sz="2400" dirty="0"/>
               <a:t>Explain what Continuous Improvement Management (CIM) is and how CIM methodology can be used in projects with examples.</a:t>
             </a:r>
           </a:p>
           <a:p>
-            <a:pPr eaLnBrk="1" hangingPunct="1"/>
+            <a:pPr marL="457200" indent="-457200" eaLnBrk="1" hangingPunct="1">
+              <a:buFont typeface="+mj-lt"/>
+              <a:buAutoNum type="arabicPeriod"/>
+            </a:pPr>
             <a:r>
               <a:rPr lang="en-US" sz="2400" dirty="0"/>
               <a:t>Explain what Six Sigma is and how this process improvement approach is used to find defects and errors of a project with examples.</a:t>
             </a:r>
+          </a:p>
+          <a:p>
+            <a:pPr marL="857250" lvl="1" indent="-457200" eaLnBrk="1" hangingPunct="1"/>
+            <a:r>
+              <a:rPr lang="en-US" sz="2200" dirty="0"/>
+              <a:t>DMAIC</a:t>
+            </a:r>
+          </a:p>
+          <a:p>
+            <a:pPr marL="857250" lvl="1" indent="-457200" eaLnBrk="1" hangingPunct="1"/>
+            <a:r>
+              <a:rPr lang="en-US" sz="2200" dirty="0"/>
+              <a:t>DMADV</a:t>
+            </a:r>
+          </a:p>
+          <a:p>
+            <a:pPr marL="0" indent="0" eaLnBrk="1" hangingPunct="1">
+              <a:buNone/>
+            </a:pPr>
+            <a:endParaRPr lang="en-US" sz="2400" dirty="0"/>
           </a:p>
         </p:txBody>
       </p:sp>
@@ -16998,8 +17627,8 @@
           <a:p>
             <a:pPr eaLnBrk="1" hangingPunct="1"/>
             <a:r>
-              <a:rPr lang="en-US"/>
-              <a:t>Six Sigma</a:t>
+              <a:rPr lang="en-US" dirty="0"/>
+              <a:t>3 Six Sigma</a:t>
             </a:r>
           </a:p>
         </p:txBody>
@@ -17176,8 +17805,8 @@
           <a:p>
             <a:pPr eaLnBrk="1" hangingPunct="1"/>
             <a:r>
-              <a:rPr lang="en-US"/>
-              <a:t>Six Sigma</a:t>
+              <a:rPr lang="en-US" dirty="0"/>
+              <a:t>3 Six Sigma</a:t>
             </a:r>
           </a:p>
         </p:txBody>
@@ -17537,8 +18166,8 @@
           <a:p>
             <a:pPr eaLnBrk="1" hangingPunct="1"/>
             <a:r>
-              <a:rPr lang="en-US"/>
-              <a:t>DMAIC</a:t>
+              <a:rPr lang="en-US" dirty="0"/>
+              <a:t>3-a DMAIC</a:t>
             </a:r>
           </a:p>
         </p:txBody>
@@ -17725,8 +18354,8 @@
           <a:p>
             <a:pPr eaLnBrk="1" hangingPunct="1"/>
             <a:r>
-              <a:rPr lang="en-US"/>
-              <a:t>DMAIC</a:t>
+              <a:rPr lang="en-US" dirty="0"/>
+              <a:t>3-a DMAIC</a:t>
             </a:r>
           </a:p>
         </p:txBody>
@@ -17913,8 +18542,8 @@
           <a:p>
             <a:pPr eaLnBrk="1" hangingPunct="1"/>
             <a:r>
-              <a:rPr lang="en-US"/>
-              <a:t>DMAIC</a:t>
+              <a:rPr lang="en-US" dirty="0"/>
+              <a:t>3-a DMAIC</a:t>
             </a:r>
           </a:p>
         </p:txBody>
@@ -18101,8 +18730,8 @@
           <a:p>
             <a:pPr eaLnBrk="1" hangingPunct="1"/>
             <a:r>
-              <a:rPr lang="en-US"/>
-              <a:t>DMAIC</a:t>
+              <a:rPr lang="en-US" dirty="0"/>
+              <a:t>3-a DMAIC</a:t>
             </a:r>
           </a:p>
         </p:txBody>
@@ -18289,8 +18918,8 @@
           <a:p>
             <a:pPr eaLnBrk="1" hangingPunct="1"/>
             <a:r>
-              <a:rPr lang="en-US"/>
-              <a:t>DMAIC</a:t>
+              <a:rPr lang="en-US" dirty="0"/>
+              <a:t>3-a DMAIC</a:t>
             </a:r>
           </a:p>
         </p:txBody>
@@ -18463,8 +19092,8 @@
           <a:p>
             <a:pPr eaLnBrk="1" hangingPunct="1"/>
             <a:r>
-              <a:rPr lang="en-US"/>
-              <a:t>Software Process</a:t>
+              <a:rPr lang="en-US" dirty="0"/>
+              <a:t>4 Software Process</a:t>
             </a:r>
           </a:p>
         </p:txBody>
@@ -18647,8 +19276,8 @@
           <a:p>
             <a:pPr eaLnBrk="1" hangingPunct="1"/>
             <a:r>
-              <a:rPr lang="en-US"/>
-              <a:t>CMM and CMMI</a:t>
+              <a:rPr lang="en-US" dirty="0"/>
+              <a:t>4-a CMM and CMMI</a:t>
             </a:r>
           </a:p>
         </p:txBody>
@@ -18804,8 +19433,8 @@
           <a:p>
             <a:pPr eaLnBrk="1" hangingPunct="1"/>
             <a:r>
-              <a:rPr lang="en-US"/>
-              <a:t>CMM and CMMI</a:t>
+              <a:rPr lang="en-US" dirty="0"/>
+              <a:t>4-a CMM and CMMI</a:t>
             </a:r>
           </a:p>
         </p:txBody>
@@ -18917,17 +19546,62 @@
           <a:bodyPr/>
           <a:lstStyle/>
           <a:p>
-            <a:pPr eaLnBrk="1" hangingPunct="1"/>
-            <a:r>
-              <a:rPr lang="en-US" sz="2400"/>
-              <a:t>Describe the five levels of Capability Maturity Model (CMM) in software projects and understand how organizations can attain the highest software maturity level.</a:t>
-            </a:r>
-          </a:p>
-          <a:p>
-            <a:pPr eaLnBrk="1" hangingPunct="1"/>
-            <a:r>
-              <a:rPr lang="en-US" sz="2400"/>
-              <a:t>Describe Software Development Life Cycle (SDLC) and the new paradigms in software projects including extreme programming and agile modeling, their inputs and outputs, and how those software development models can be used effectively in software projects.</a:t>
+            <a:pPr marL="457200" indent="-457200" eaLnBrk="1" hangingPunct="1">
+              <a:buFont typeface="+mj-lt"/>
+              <a:buAutoNum type="arabicPeriod" startAt="4"/>
+            </a:pPr>
+            <a:r>
+              <a:rPr lang="en-US" sz="2400" dirty="0"/>
+              <a:t>Software Process, the models for enhancing software process</a:t>
+            </a:r>
+          </a:p>
+          <a:p>
+            <a:pPr lvl="1" eaLnBrk="1" hangingPunct="1"/>
+            <a:r>
+              <a:rPr lang="en-US" sz="2200" dirty="0"/>
+              <a:t>CMM and CMMI</a:t>
+            </a:r>
+          </a:p>
+          <a:p>
+            <a:pPr lvl="1" eaLnBrk="1" hangingPunct="1"/>
+            <a:r>
+              <a:rPr lang="en-US" sz="2200" dirty="0"/>
+              <a:t>SDLC</a:t>
+            </a:r>
+          </a:p>
+          <a:p>
+            <a:pPr lvl="1" eaLnBrk="1" hangingPunct="1"/>
+            <a:r>
+              <a:rPr lang="en-US" sz="2200" dirty="0"/>
+              <a:t>Spiral</a:t>
+            </a:r>
+          </a:p>
+          <a:p>
+            <a:pPr lvl="1" eaLnBrk="1" hangingPunct="1"/>
+            <a:r>
+              <a:rPr lang="en-US" sz="2200" dirty="0"/>
+              <a:t>Unified Process</a:t>
+            </a:r>
+          </a:p>
+          <a:p>
+            <a:pPr lvl="1" eaLnBrk="1" hangingPunct="1"/>
+            <a:r>
+              <a:rPr lang="en-US" sz="2200" dirty="0"/>
+              <a:t>Scrum</a:t>
+            </a:r>
+          </a:p>
+          <a:p>
+            <a:pPr lvl="1" eaLnBrk="1" hangingPunct="1"/>
+            <a:r>
+              <a:rPr lang="en-US" sz="2200" dirty="0"/>
+              <a:t>Extreme Programming (XP)</a:t>
+            </a:r>
+          </a:p>
+          <a:p>
+            <a:pPr lvl="1" eaLnBrk="1" hangingPunct="1"/>
+            <a:r>
+              <a:rPr lang="en-US" sz="2200" dirty="0"/>
+              <a:t>Agile Modeling (AM)</a:t>
             </a:r>
           </a:p>
         </p:txBody>
@@ -19118,8 +19792,8 @@
           <a:p>
             <a:pPr eaLnBrk="1" hangingPunct="1"/>
             <a:r>
-              <a:rPr lang="en-US"/>
-              <a:t>The  Benefits of CMM and CMMI</a:t>
+              <a:rPr lang="en-US" dirty="0"/>
+              <a:t>4-a The  Benefits of CMM and CMMI</a:t>
             </a:r>
           </a:p>
         </p:txBody>
@@ -19233,8 +19907,8 @@
           <a:p>
             <a:pPr eaLnBrk="1" hangingPunct="1"/>
             <a:r>
-              <a:rPr lang="en-US"/>
-              <a:t>CMM</a:t>
+              <a:rPr lang="en-US" dirty="0"/>
+              <a:t>4-a CMM</a:t>
             </a:r>
           </a:p>
         </p:txBody>
@@ -19380,8 +20054,8 @@
           <a:p>
             <a:pPr eaLnBrk="1" hangingPunct="1"/>
             <a:r>
-              <a:rPr lang="en-US"/>
-              <a:t>SDLC</a:t>
+              <a:rPr lang="en-US" dirty="0"/>
+              <a:t>4-b SDLC</a:t>
             </a:r>
           </a:p>
         </p:txBody>
@@ -19527,8 +20201,8 @@
           <a:p>
             <a:pPr eaLnBrk="1" hangingPunct="1"/>
             <a:r>
-              <a:rPr lang="en-US"/>
-              <a:t>Iterative SDLC</a:t>
+              <a:rPr lang="en-US" dirty="0"/>
+              <a:t>4-b Iterative SDLC</a:t>
             </a:r>
           </a:p>
         </p:txBody>
@@ -19674,8 +20348,8 @@
           <a:p>
             <a:pPr eaLnBrk="1" hangingPunct="1"/>
             <a:r>
-              <a:rPr lang="en-US"/>
-              <a:t>Spiral</a:t>
+              <a:rPr lang="en-US" dirty="0"/>
+              <a:t>4-c Spiral</a:t>
             </a:r>
           </a:p>
         </p:txBody>
@@ -19877,8 +20551,8 @@
           <a:p>
             <a:pPr eaLnBrk="1" hangingPunct="1"/>
             <a:r>
-              <a:rPr lang="en-US"/>
-              <a:t>Unified Process</a:t>
+              <a:rPr lang="en-US" dirty="0"/>
+              <a:t>4-d Unified Process (UP)</a:t>
             </a:r>
           </a:p>
         </p:txBody>
@@ -20038,7 +20712,7 @@
           <a:p>
             <a:pPr eaLnBrk="1" hangingPunct="1"/>
             <a:r>
-              <a:rPr lang="en-US" sz="2400"/>
+              <a:rPr lang="en-US" sz="2400" dirty="0"/>
               <a:t>UP is an iterative process and defines four phases including:</a:t>
             </a:r>
           </a:p>
@@ -20048,14 +20722,14 @@
               <a:buChar char="•"/>
             </a:pPr>
             <a:r>
-              <a:rPr lang="en-US" sz="2400"/>
+              <a:rPr lang="en-US" sz="2400" dirty="0"/>
               <a:t>Inception</a:t>
             </a:r>
           </a:p>
           <a:p>
             <a:pPr lvl="2" eaLnBrk="1" hangingPunct="1"/>
             <a:r>
-              <a:rPr lang="en-US" sz="2400"/>
+              <a:rPr lang="en-US" sz="2400" dirty="0"/>
               <a:t>Acquire Customer requirements and Planning</a:t>
             </a:r>
           </a:p>
@@ -20065,14 +20739,14 @@
               <a:buChar char="•"/>
             </a:pPr>
             <a:r>
-              <a:rPr lang="en-US" sz="2400"/>
+              <a:rPr lang="en-US" sz="2400" dirty="0"/>
               <a:t>Elaboration</a:t>
             </a:r>
           </a:p>
           <a:p>
             <a:pPr lvl="2" eaLnBrk="1" hangingPunct="1"/>
             <a:r>
-              <a:rPr lang="en-US" sz="2400"/>
+              <a:rPr lang="en-US" sz="2400" dirty="0"/>
               <a:t>Use Case Diagrams</a:t>
             </a:r>
           </a:p>
@@ -20082,21 +20756,21 @@
               <a:buChar char="•"/>
             </a:pPr>
             <a:r>
-              <a:rPr lang="en-US" sz="2400"/>
+              <a:rPr lang="en-US" sz="2400" dirty="0"/>
               <a:t>Construction</a:t>
             </a:r>
           </a:p>
           <a:p>
             <a:pPr lvl="2" eaLnBrk="1" hangingPunct="1"/>
             <a:r>
-              <a:rPr lang="en-US" sz="2400"/>
+              <a:rPr lang="en-US" sz="2400" dirty="0"/>
               <a:t>Development</a:t>
             </a:r>
           </a:p>
           <a:p>
             <a:pPr lvl="2" eaLnBrk="1" hangingPunct="1"/>
             <a:r>
-              <a:rPr lang="en-US" sz="2400"/>
+              <a:rPr lang="en-US" sz="2400" dirty="0"/>
               <a:t> Time-boxed iterations (e.g. 1 week)</a:t>
             </a:r>
           </a:p>
@@ -20106,21 +20780,21 @@
               <a:buChar char="•"/>
             </a:pPr>
             <a:r>
-              <a:rPr lang="en-US" sz="2400"/>
+              <a:rPr lang="en-US" sz="2400" dirty="0"/>
               <a:t>Transition</a:t>
             </a:r>
           </a:p>
           <a:p>
             <a:pPr lvl="2" eaLnBrk="1" hangingPunct="1"/>
             <a:r>
-              <a:rPr lang="en-US" sz="2400"/>
+              <a:rPr lang="en-US" sz="2400" dirty="0"/>
               <a:t>Beta testing and Final testing </a:t>
             </a:r>
           </a:p>
           <a:p>
             <a:pPr lvl="2" eaLnBrk="1" hangingPunct="1"/>
             <a:r>
-              <a:rPr lang="en-US" sz="2400"/>
+              <a:rPr lang="en-US" sz="2400" dirty="0"/>
               <a:t>Installation, training, and support</a:t>
             </a:r>
           </a:p>
@@ -20148,8 +20822,8 @@
           <a:p>
             <a:pPr eaLnBrk="1" hangingPunct="1"/>
             <a:r>
-              <a:rPr lang="en-US"/>
-              <a:t>Unified Process and Use Case Analysis</a:t>
+              <a:rPr lang="en-US" dirty="0"/>
+              <a:t>4-d Unified Process and Use Case Analysis</a:t>
             </a:r>
           </a:p>
         </p:txBody>
@@ -21393,8 +22067,8 @@
           <a:p>
             <a:pPr eaLnBrk="1" hangingPunct="1"/>
             <a:r>
-              <a:rPr lang="en-US"/>
-              <a:t>Unified Process</a:t>
+              <a:rPr lang="en-US" dirty="0"/>
+              <a:t>4-d Unified Process</a:t>
             </a:r>
           </a:p>
         </p:txBody>
@@ -21655,8 +22329,8 @@
           <a:p>
             <a:pPr eaLnBrk="1" hangingPunct="1"/>
             <a:r>
-              <a:rPr lang="en-US"/>
-              <a:t>Unified Process</a:t>
+              <a:rPr lang="en-US" dirty="0"/>
+              <a:t>4-d Unified Process</a:t>
             </a:r>
           </a:p>
         </p:txBody>
@@ -21880,8 +22554,8 @@
           <a:p>
             <a:pPr eaLnBrk="1" hangingPunct="1"/>
             <a:r>
-              <a:rPr lang="en-US"/>
-              <a:t>Scrum</a:t>
+              <a:rPr lang="en-US" dirty="0"/>
+              <a:t>4-e Scrum</a:t>
             </a:r>
           </a:p>
         </p:txBody>
@@ -22137,7 +22811,7 @@
         <p:spPr>
           <a:xfrm>
             <a:off x="1316038" y="1071563"/>
-            <a:ext cx="3925887" cy="339725"/>
+            <a:ext cx="4703762" cy="339725"/>
           </a:xfrm>
         </p:spPr>
         <p:txBody>
@@ -22146,8 +22820,8 @@
           <a:p>
             <a:pPr eaLnBrk="1" hangingPunct="1"/>
             <a:r>
-              <a:rPr lang="en-US"/>
-              <a:t>Extreme Programming (XP)</a:t>
+              <a:rPr lang="en-US" dirty="0"/>
+              <a:t>4-f Extreme Programming (XP)</a:t>
             </a:r>
           </a:p>
         </p:txBody>
@@ -22284,7 +22958,7 @@
         <p:spPr>
           <a:xfrm>
             <a:off x="1316038" y="1071563"/>
-            <a:ext cx="3925887" cy="339725"/>
+            <a:ext cx="4977884" cy="339725"/>
           </a:xfrm>
         </p:spPr>
         <p:txBody>
@@ -22293,8 +22967,8 @@
           <a:p>
             <a:pPr eaLnBrk="1" hangingPunct="1"/>
             <a:r>
-              <a:rPr lang="en-US"/>
-              <a:t>Extreme Programming (XP)</a:t>
+              <a:rPr lang="en-US" dirty="0"/>
+              <a:t>4-f Extreme Programming (XP)</a:t>
             </a:r>
           </a:p>
         </p:txBody>
@@ -22440,8 +23114,8 @@
           <a:p>
             <a:pPr eaLnBrk="1" hangingPunct="1"/>
             <a:r>
-              <a:rPr lang="en-US"/>
-              <a:t>Agile Modeling (AM)</a:t>
+              <a:rPr lang="en-US" dirty="0"/>
+              <a:t>4-g Agile Modeling (AM)</a:t>
             </a:r>
           </a:p>
         </p:txBody>
@@ -22683,125 +23357,6 @@
 </p:sld>
 </file>
 
-<file path=ppt/slides/slide44.xml><?xml version="1.0" encoding="utf-8"?>
-<p:sld xmlns:a="http://schemas.openxmlformats.org/drawingml/2006/main" xmlns:r="http://schemas.openxmlformats.org/officeDocument/2006/relationships" xmlns:p="http://schemas.openxmlformats.org/presentationml/2006/main">
-  <p:cSld>
-    <p:spTree>
-      <p:nvGrpSpPr>
-        <p:cNvPr id="1" name=""/>
-        <p:cNvGrpSpPr/>
-        <p:nvPr/>
-      </p:nvGrpSpPr>
-      <p:grpSpPr>
-        <a:xfrm>
-          <a:off x="0" y="0"/>
-          <a:ext cx="0" cy="0"/>
-          <a:chOff x="0" y="0"/>
-          <a:chExt cx="0" cy="0"/>
-        </a:xfrm>
-      </p:grpSpPr>
-      <p:sp>
-        <p:nvSpPr>
-          <p:cNvPr id="117761" name="Footer Placeholder 4"/>
-          <p:cNvSpPr>
-            <a:spLocks noGrp="1"/>
-          </p:cNvSpPr>
-          <p:nvPr>
-            <p:ph type="ftr" sz="quarter" idx="11"/>
-          </p:nvPr>
-        </p:nvSpPr>
-        <p:spPr bwMode="auto">
-          <a:noFill/>
-          <a:ln>
-            <a:miter lim="800000"/>
-            <a:headEnd/>
-            <a:tailEnd/>
-          </a:ln>
-        </p:spPr>
-        <p:txBody>
-          <a:bodyPr/>
-          <a:lstStyle/>
-          <a:p>
-            <a:r>
-              <a:rPr lang="en-US"/>
-              <a:t>Copyright © 2013 Pearson Education, Inc. Publishing as Prentice Hall</a:t>
-            </a:r>
-          </a:p>
-        </p:txBody>
-      </p:sp>
-      <p:sp>
-        <p:nvSpPr>
-          <p:cNvPr id="5" name="Slide Number Placeholder 4"/>
-          <p:cNvSpPr>
-            <a:spLocks noGrp="1"/>
-          </p:cNvSpPr>
-          <p:nvPr>
-            <p:ph type="sldNum" sz="quarter" idx="12"/>
-          </p:nvPr>
-        </p:nvSpPr>
-        <p:spPr/>
-        <p:txBody>
-          <a:bodyPr/>
-          <a:lstStyle/>
-          <a:p>
-            <a:pPr>
-              <a:defRPr/>
-            </a:pPr>
-            <a:r>
-              <a:rPr lang="en-US"/>
-              <a:t>1-</a:t>
-            </a:r>
-            <a:fld id="{7CA303D9-3666-4C7A-9EE6-5EEC906CCF7C}" type="slidenum">
-              <a:rPr lang="en-US"/>
-              <a:pPr>
-                <a:defRPr/>
-              </a:pPr>
-              <a:t>44</a:t>
-            </a:fld>
-            <a:endParaRPr lang="en-US"/>
-          </a:p>
-        </p:txBody>
-      </p:sp>
-      <p:pic>
-        <p:nvPicPr>
-          <p:cNvPr id="117763" name="Picture 3" descr="3293795473_47524415"/>
-          <p:cNvPicPr>
-            <a:picLocks noChangeAspect="1" noChangeArrowheads="1"/>
-          </p:cNvPicPr>
-          <p:nvPr/>
-        </p:nvPicPr>
-        <p:blipFill>
-          <a:blip r:embed="rId2"/>
-          <a:srcRect/>
-          <a:stretch>
-            <a:fillRect/>
-          </a:stretch>
-        </p:blipFill>
-        <p:spPr bwMode="auto">
-          <a:xfrm>
-            <a:off x="593725" y="1504950"/>
-            <a:ext cx="7864475" cy="2457450"/>
-          </a:xfrm>
-          <a:prstGeom prst="rect">
-            <a:avLst/>
-          </a:prstGeom>
-          <a:noFill/>
-          <a:ln w="9525">
-            <a:noFill/>
-            <a:miter lim="800000"/>
-            <a:headEnd/>
-            <a:tailEnd/>
-          </a:ln>
-        </p:spPr>
-      </p:pic>
-    </p:spTree>
-  </p:cSld>
-  <p:clrMapOvr>
-    <a:masterClrMapping/>
-  </p:clrMapOvr>
-</p:sld>
-</file>
-
 <file path=ppt/slides/slide5.xml><?xml version="1.0" encoding="utf-8"?>
 <p:sld xmlns:a="http://schemas.openxmlformats.org/drawingml/2006/main" xmlns:r="http://schemas.openxmlformats.org/officeDocument/2006/relationships" xmlns:p="http://schemas.openxmlformats.org/presentationml/2006/main">
   <p:cSld>
@@ -22891,7 +23446,7 @@
         <p:spPr bwMode="auto">
           <a:xfrm>
             <a:off x="1270000" y="1020763"/>
-            <a:ext cx="989013" cy="400050"/>
+            <a:ext cx="1176989" cy="400110"/>
           </a:xfrm>
           <a:prstGeom prst="rect">
             <a:avLst/>
@@ -22911,10 +23466,10 @@
           <a:lstStyle/>
           <a:p>
             <a:r>
-              <a:rPr lang="en-US" sz="2000" b="1">
+              <a:rPr lang="en-US" sz="2000" b="1" dirty="0">
                 <a:latin typeface="Calibri" pitchFamily="34" charset="0"/>
               </a:rPr>
-              <a:t>Process</a:t>
+              <a:t>1 Process</a:t>
             </a:r>
           </a:p>
         </p:txBody>
@@ -23077,11 +23632,11 @@
           <a:p>
             <a:pPr eaLnBrk="1" hangingPunct="1"/>
             <a:r>
-              <a:rPr lang="en-US" sz="2400"/>
+              <a:rPr lang="en-US" sz="2400" dirty="0"/>
               <a:t>Graduation party </a:t>
             </a:r>
             <a:r>
-              <a:rPr lang="en-US" sz="2400" b="1" i="1">
+              <a:rPr lang="en-US" sz="2400" b="1" i="1" dirty="0">
                 <a:solidFill>
                   <a:srgbClr val="FF0000"/>
                 </a:solidFill>
@@ -23095,7 +23650,7 @@
               <a:buChar char="•"/>
             </a:pPr>
             <a:r>
-              <a:rPr lang="en-US" sz="2400"/>
+              <a:rPr lang="en-US" sz="2400" dirty="0"/>
               <a:t>Series of interrelated activities – input to output</a:t>
             </a:r>
           </a:p>
@@ -23105,7 +23660,7 @@
               <a:buChar char="•"/>
             </a:pPr>
             <a:r>
-              <a:rPr lang="en-US" sz="2400"/>
+              <a:rPr lang="en-US" sz="2400" dirty="0"/>
               <a:t>Make a list of friends</a:t>
             </a:r>
           </a:p>
@@ -23115,7 +23670,7 @@
               <a:buChar char="•"/>
             </a:pPr>
             <a:r>
-              <a:rPr lang="en-US" sz="2400"/>
+              <a:rPr lang="en-US" sz="2400" dirty="0"/>
               <a:t>Invite them for a party</a:t>
             </a:r>
           </a:p>
@@ -23125,7 +23680,7 @@
               <a:buChar char="•"/>
             </a:pPr>
             <a:r>
-              <a:rPr lang="en-US" sz="2400"/>
+              <a:rPr lang="en-US" sz="2400" dirty="0"/>
               <a:t>Buy food and beverages</a:t>
             </a:r>
           </a:p>
@@ -23135,21 +23690,21 @@
               <a:buChar char="•"/>
             </a:pPr>
             <a:r>
-              <a:rPr lang="en-US" sz="2400"/>
+              <a:rPr lang="en-US" sz="2400" dirty="0"/>
               <a:t>Have fun</a:t>
             </a:r>
           </a:p>
           <a:p>
             <a:pPr eaLnBrk="1" hangingPunct="1"/>
-            <a:endParaRPr lang="en-US" sz="2400"/>
+            <a:endParaRPr lang="en-US" sz="2400" dirty="0"/>
           </a:p>
           <a:p>
             <a:pPr eaLnBrk="1" hangingPunct="1"/>
-            <a:endParaRPr lang="en-US" sz="2400"/>
+            <a:endParaRPr lang="en-US" sz="2400" dirty="0"/>
           </a:p>
           <a:p>
             <a:pPr eaLnBrk="1" hangingPunct="1"/>
-            <a:endParaRPr lang="en-US" sz="2400"/>
+            <a:endParaRPr lang="en-US" sz="2400" dirty="0"/>
           </a:p>
         </p:txBody>
       </p:sp>
@@ -23175,8 +23730,8 @@
           <a:p>
             <a:pPr eaLnBrk="1" hangingPunct="1"/>
             <a:r>
-              <a:rPr lang="en-US"/>
-              <a:t>Process and Procedure</a:t>
+              <a:rPr lang="en-US" dirty="0"/>
+              <a:t>1 Process and Procedure</a:t>
             </a:r>
           </a:p>
         </p:txBody>
@@ -23590,8 +24145,8 @@
           <a:p>
             <a:pPr eaLnBrk="1" hangingPunct="1"/>
             <a:r>
-              <a:rPr lang="en-US"/>
-              <a:t>Process Improvement</a:t>
+              <a:rPr lang="en-US" dirty="0"/>
+              <a:t>1 Process Improvement</a:t>
             </a:r>
           </a:p>
         </p:txBody>
@@ -23854,8 +24409,8 @@
           <a:p>
             <a:pPr eaLnBrk="1" hangingPunct="1"/>
             <a:r>
-              <a:rPr lang="en-US"/>
-              <a:t>Process Improvement</a:t>
+              <a:rPr lang="en-US" dirty="0"/>
+              <a:t>1 Process Improvement</a:t>
             </a:r>
           </a:p>
         </p:txBody>
@@ -23960,7 +24515,7 @@
         <p:spPr>
           <a:xfrm>
             <a:off x="1316038" y="1071563"/>
-            <a:ext cx="5905377" cy="339725"/>
+            <a:ext cx="6331671" cy="339725"/>
           </a:xfrm>
         </p:spPr>
         <p:txBody>
@@ -23970,7 +24525,7 @@
             <a:pPr eaLnBrk="1" hangingPunct="1"/>
             <a:r>
               <a:rPr lang="en-US" dirty="0"/>
-              <a:t>Continuous Improvement Management  CIM</a:t>
+              <a:t>2 Continuous Improvement Management  CIM</a:t>
             </a:r>
           </a:p>
         </p:txBody>

</xml_diff>